<commit_message>
finish presentation with explanations
</commit_message>
<xml_diff>
--- a/Presentations/DS_Project_Week-4.pptx
+++ b/Presentations/DS_Project_Week-4.pptx
@@ -209,7 +209,7 @@
           <a:p>
             <a:fld id="{AED9CDE3-D1C5-48DA-9920-F3058EBF21A6}" type="datetimeFigureOut">
               <a:rPr lang="LID4096" smtClean="0"/>
-              <a:t>03/26/2025</a:t>
+              <a:t>03/27/2025</a:t>
             </a:fld>
             <a:endParaRPr lang="LID4096"/>
           </a:p>
@@ -641,7 +641,15 @@
             </a:pPr>
             <a:r>
               <a:rPr lang="en-GB" noProof="0" dirty="0"/>
-              <a:t>5: upper graph (What do you see? -&gt; more known sport now) (Emilie)</a:t>
+              <a:t>2: average explanation, top chart, show all tournaments (What do you see? -&gt; </a:t>
+            </a:r>
+            <a:r>
+              <a:rPr lang="en-GB" noProof="0" dirty="0" err="1"/>
+              <a:t>niveau</a:t>
+            </a:r>
+            <a:r>
+              <a:rPr lang="en-GB" noProof="0" dirty="0"/>
+              <a:t> increased as sport grows) (Emilie)</a:t>
             </a:r>
           </a:p>
           <a:p>
@@ -651,26 +659,18 @@
             </a:pPr>
             <a:r>
               <a:rPr lang="en-GB" noProof="0" dirty="0"/>
-              <a:t>2: average explanation, top chart, show all tournaments (What do you see? -&gt; </a:t>
-            </a:r>
-            <a:r>
-              <a:rPr lang="en-GB" noProof="0" dirty="0" err="1"/>
-              <a:t>niveau</a:t>
+              <a:t>5: upper graph (What do you see? -&gt; more known sport now) (Emilie)
+4: checkout </a:t>
+            </a:r>
+            <a:r>
+              <a:rPr lang="en-GB" noProof="0"/>
+              <a:t>percentage explanation (</a:t>
             </a:r>
             <a:r>
               <a:rPr lang="en-GB" noProof="0" dirty="0"/>
-              <a:t> increased as sport grows) (Emilie)
-4: checkout percentage explanation, bottom chart (What do you see?) (Sara)
-6: choose option</a:t>
-            </a:r>
-            <a:r>
-              <a:rPr lang="en-GB" noProof="0"/>
-              <a:t>, 5 </a:t>
-            </a:r>
-            <a:r>
-              <a:rPr lang="en-GB" noProof="0" dirty="0"/>
-              <a:t>ranks, age, nationality (Sara)
-15: show toggle, Luke Humphries (What do you see?) (Sara)</a:t>
+              <a:t>What do you see?) (Sara)
+6: choose option, 5 ranks, age, nationality (Sara)
+15: show toggle, Rob Cross, D1 (What do you see?) (Sara)</a:t>
             </a:r>
             <a:endParaRPr lang="LID4096" dirty="0"/>
           </a:p>
@@ -843,7 +843,7 @@
           <a:p>
             <a:fld id="{846CE7D5-CF57-46EF-B807-FDD0502418D4}" type="datetimeFigureOut">
               <a:rPr lang="en-US" smtClean="0"/>
-              <a:t>3/26/2025</a:t>
+              <a:t>3/27/2025</a:t>
             </a:fld>
             <a:endParaRPr lang="en-US"/>
           </a:p>
@@ -1013,7 +1013,7 @@
           <a:p>
             <a:fld id="{846CE7D5-CF57-46EF-B807-FDD0502418D4}" type="datetimeFigureOut">
               <a:rPr lang="en-US" smtClean="0"/>
-              <a:t>3/26/2025</a:t>
+              <a:t>3/27/2025</a:t>
             </a:fld>
             <a:endParaRPr lang="en-US"/>
           </a:p>
@@ -1193,7 +1193,7 @@
           <a:p>
             <a:fld id="{846CE7D5-CF57-46EF-B807-FDD0502418D4}" type="datetimeFigureOut">
               <a:rPr lang="en-US" smtClean="0"/>
-              <a:t>3/26/2025</a:t>
+              <a:t>3/27/2025</a:t>
             </a:fld>
             <a:endParaRPr lang="en-US"/>
           </a:p>
@@ -1383,7 +1383,7 @@
           <a:p>
             <a:fld id="{D3EB3054-B75A-4BD7-8B3E-8DC0F614FAF3}" type="datetimeFigureOut">
               <a:rPr lang="de-DE" smtClean="0"/>
-              <a:t>26.03.2025</a:t>
+              <a:t>27.03.2025</a:t>
             </a:fld>
             <a:endParaRPr lang="de-DE"/>
           </a:p>
@@ -1551,7 +1551,7 @@
           <a:p>
             <a:fld id="{D3EB3054-B75A-4BD7-8B3E-8DC0F614FAF3}" type="datetimeFigureOut">
               <a:rPr lang="de-DE" smtClean="0"/>
-              <a:t>26.03.2025</a:t>
+              <a:t>27.03.2025</a:t>
             </a:fld>
             <a:endParaRPr lang="de-DE"/>
           </a:p>
@@ -1796,7 +1796,7 @@
           <a:p>
             <a:fld id="{D3EB3054-B75A-4BD7-8B3E-8DC0F614FAF3}" type="datetimeFigureOut">
               <a:rPr lang="de-DE" smtClean="0"/>
-              <a:t>26.03.2025</a:t>
+              <a:t>27.03.2025</a:t>
             </a:fld>
             <a:endParaRPr lang="de-DE"/>
           </a:p>
@@ -2025,7 +2025,7 @@
           <a:p>
             <a:fld id="{D3EB3054-B75A-4BD7-8B3E-8DC0F614FAF3}" type="datetimeFigureOut">
               <a:rPr lang="de-DE" smtClean="0"/>
-              <a:t>26.03.2025</a:t>
+              <a:t>27.03.2025</a:t>
             </a:fld>
             <a:endParaRPr lang="de-DE"/>
           </a:p>
@@ -2389,7 +2389,7 @@
           <a:p>
             <a:fld id="{D3EB3054-B75A-4BD7-8B3E-8DC0F614FAF3}" type="datetimeFigureOut">
               <a:rPr lang="de-DE" smtClean="0"/>
-              <a:t>26.03.2025</a:t>
+              <a:t>27.03.2025</a:t>
             </a:fld>
             <a:endParaRPr lang="de-DE"/>
           </a:p>
@@ -2506,7 +2506,7 @@
           <a:p>
             <a:fld id="{D3EB3054-B75A-4BD7-8B3E-8DC0F614FAF3}" type="datetimeFigureOut">
               <a:rPr lang="de-DE" smtClean="0"/>
-              <a:t>26.03.2025</a:t>
+              <a:t>27.03.2025</a:t>
             </a:fld>
             <a:endParaRPr lang="de-DE"/>
           </a:p>
@@ -2601,7 +2601,7 @@
           <a:p>
             <a:fld id="{D3EB3054-B75A-4BD7-8B3E-8DC0F614FAF3}" type="datetimeFigureOut">
               <a:rPr lang="de-DE" smtClean="0"/>
-              <a:t>26.03.2025</a:t>
+              <a:t>27.03.2025</a:t>
             </a:fld>
             <a:endParaRPr lang="de-DE"/>
           </a:p>
@@ -2876,7 +2876,7 @@
           <a:p>
             <a:fld id="{D3EB3054-B75A-4BD7-8B3E-8DC0F614FAF3}" type="datetimeFigureOut">
               <a:rPr lang="de-DE" smtClean="0"/>
-              <a:t>26.03.2025</a:t>
+              <a:t>27.03.2025</a:t>
             </a:fld>
             <a:endParaRPr lang="de-DE"/>
           </a:p>
@@ -3046,7 +3046,7 @@
           <a:p>
             <a:fld id="{846CE7D5-CF57-46EF-B807-FDD0502418D4}" type="datetimeFigureOut">
               <a:rPr lang="en-US" smtClean="0"/>
-              <a:t>3/26/2025</a:t>
+              <a:t>3/27/2025</a:t>
             </a:fld>
             <a:endParaRPr lang="en-US"/>
           </a:p>
@@ -3298,7 +3298,7 @@
           <a:p>
             <a:fld id="{D3EB3054-B75A-4BD7-8B3E-8DC0F614FAF3}" type="datetimeFigureOut">
               <a:rPr lang="de-DE" smtClean="0"/>
-              <a:t>26.03.2025</a:t>
+              <a:t>27.03.2025</a:t>
             </a:fld>
             <a:endParaRPr lang="de-DE"/>
           </a:p>
@@ -3466,7 +3466,7 @@
           <a:p>
             <a:fld id="{D3EB3054-B75A-4BD7-8B3E-8DC0F614FAF3}" type="datetimeFigureOut">
               <a:rPr lang="de-DE" smtClean="0"/>
-              <a:t>26.03.2025</a:t>
+              <a:t>27.03.2025</a:t>
             </a:fld>
             <a:endParaRPr lang="de-DE"/>
           </a:p>
@@ -3644,7 +3644,7 @@
           <a:p>
             <a:fld id="{D3EB3054-B75A-4BD7-8B3E-8DC0F614FAF3}" type="datetimeFigureOut">
               <a:rPr lang="de-DE" smtClean="0"/>
-              <a:t>26.03.2025</a:t>
+              <a:t>27.03.2025</a:t>
             </a:fld>
             <a:endParaRPr lang="de-DE"/>
           </a:p>
@@ -3890,7 +3890,7 @@
           <a:p>
             <a:fld id="{846CE7D5-CF57-46EF-B807-FDD0502418D4}" type="datetimeFigureOut">
               <a:rPr lang="en-US" smtClean="0"/>
-              <a:t>3/26/2025</a:t>
+              <a:t>3/27/2025</a:t>
             </a:fld>
             <a:endParaRPr lang="en-US"/>
           </a:p>
@@ -4122,7 +4122,7 @@
           <a:p>
             <a:fld id="{846CE7D5-CF57-46EF-B807-FDD0502418D4}" type="datetimeFigureOut">
               <a:rPr lang="en-US" smtClean="0"/>
-              <a:t>3/26/2025</a:t>
+              <a:t>3/27/2025</a:t>
             </a:fld>
             <a:endParaRPr lang="en-US"/>
           </a:p>
@@ -4489,7 +4489,7 @@
           <a:p>
             <a:fld id="{846CE7D5-CF57-46EF-B807-FDD0502418D4}" type="datetimeFigureOut">
               <a:rPr lang="en-US" smtClean="0"/>
-              <a:t>3/26/2025</a:t>
+              <a:t>3/27/2025</a:t>
             </a:fld>
             <a:endParaRPr lang="en-US"/>
           </a:p>
@@ -4607,7 +4607,7 @@
           <a:p>
             <a:fld id="{846CE7D5-CF57-46EF-B807-FDD0502418D4}" type="datetimeFigureOut">
               <a:rPr lang="en-US" smtClean="0"/>
-              <a:t>3/26/2025</a:t>
+              <a:t>3/27/2025</a:t>
             </a:fld>
             <a:endParaRPr lang="en-US"/>
           </a:p>
@@ -4702,7 +4702,7 @@
           <a:p>
             <a:fld id="{846CE7D5-CF57-46EF-B807-FDD0502418D4}" type="datetimeFigureOut">
               <a:rPr lang="en-US" smtClean="0"/>
-              <a:t>3/26/2025</a:t>
+              <a:t>3/27/2025</a:t>
             </a:fld>
             <a:endParaRPr lang="en-US"/>
           </a:p>
@@ -4979,7 +4979,7 @@
           <a:p>
             <a:fld id="{846CE7D5-CF57-46EF-B807-FDD0502418D4}" type="datetimeFigureOut">
               <a:rPr lang="en-US" smtClean="0"/>
-              <a:t>3/26/2025</a:t>
+              <a:t>3/27/2025</a:t>
             </a:fld>
             <a:endParaRPr lang="en-US"/>
           </a:p>
@@ -5236,7 +5236,7 @@
           <a:p>
             <a:fld id="{846CE7D5-CF57-46EF-B807-FDD0502418D4}" type="datetimeFigureOut">
               <a:rPr lang="en-US" smtClean="0"/>
-              <a:t>3/26/2025</a:t>
+              <a:t>3/27/2025</a:t>
             </a:fld>
             <a:endParaRPr lang="en-US"/>
           </a:p>
@@ -5449,7 +5449,7 @@
           <a:p>
             <a:fld id="{846CE7D5-CF57-46EF-B807-FDD0502418D4}" type="datetimeFigureOut">
               <a:rPr lang="en-US" smtClean="0"/>
-              <a:t>3/26/2025</a:t>
+              <a:t>3/27/2025</a:t>
             </a:fld>
             <a:endParaRPr lang="en-US"/>
           </a:p>
@@ -5987,7 +5987,7 @@
           <a:p>
             <a:fld id="{D3EB3054-B75A-4BD7-8B3E-8DC0F614FAF3}" type="datetimeFigureOut">
               <a:rPr lang="de-DE" smtClean="0"/>
-              <a:t>26.03.2025</a:t>
+              <a:t>27.03.2025</a:t>
             </a:fld>
             <a:endParaRPr lang="de-DE"/>
           </a:p>
@@ -9156,8 +9156,12 @@
           <a:lstStyle/>
           <a:p>
             <a:r>
+              <a:rPr lang="de-DE" sz="2000" dirty="0"/>
+              <a:t>Match: </a:t>
+            </a:r>
+            <a:r>
               <a:rPr lang="de-DE" sz="2000" dirty="0" err="1"/>
-              <a:t>Structure</a:t>
+              <a:t>Consists</a:t>
             </a:r>
             <a:r>
               <a:rPr lang="de-DE" sz="2000" dirty="0"/>
@@ -9169,22 +9173,35 @@
             </a:r>
             <a:r>
               <a:rPr lang="de-DE" sz="2000" dirty="0"/>
-              <a:t> a game (</a:t>
+              <a:t> multiple </a:t>
             </a:r>
             <a:r>
               <a:rPr lang="de-DE" sz="2000" dirty="0" err="1"/>
-              <a:t>Legs</a:t>
-            </a:r>
+              <a:t>legs</a:t>
+            </a:r>
+            <a:endParaRPr lang="de-DE" sz="2000" dirty="0"/>
+          </a:p>
+          <a:p>
             <a:r>
               <a:rPr lang="de-DE" sz="2000" dirty="0"/>
-              <a:t>)</a:t>
-            </a:r>
+              <a:t>Leg: </a:t>
+            </a:r>
+            <a:r>
+              <a:rPr lang="en-US" sz="2000" dirty="0"/>
+              <a:t>players attempt to reduce their score from 501 to exactly zero, finishing with a double field (outer rim)</a:t>
+            </a:r>
+            <a:endParaRPr lang="de-DE" sz="2000" dirty="0"/>
           </a:p>
           <a:p>
             <a:r>
               <a:rPr lang="de-DE" sz="2000" dirty="0"/>
-              <a:t>Averages</a:t>
-            </a:r>
+              <a:t>Average: </a:t>
+            </a:r>
+            <a:r>
+              <a:rPr lang="en-US" sz="2000" dirty="0"/>
+              <a:t>average points scored per three darts/one throw</a:t>
+            </a:r>
+            <a:endParaRPr lang="de-DE" sz="2000" dirty="0"/>
           </a:p>
           <a:p>
             <a:r>
@@ -9197,11 +9214,16 @@
             </a:r>
             <a:r>
               <a:rPr lang="de-DE" sz="2000" dirty="0" err="1"/>
-              <a:t>percentages</a:t>
-            </a:r>
-            <a:endParaRPr lang="de-DE" sz="2000" dirty="0"/>
-          </a:p>
-          <a:p>
+              <a:t>Percentage</a:t>
+            </a:r>
+            <a:r>
+              <a:rPr lang="de-DE" sz="2000" dirty="0"/>
+              <a:t>: </a:t>
+            </a:r>
+            <a:r>
+              <a:rPr lang="en-US" sz="2000" dirty="0"/>
+              <a:t>success rate of finishing a leg when a player reaches a checkout opportunity</a:t>
+            </a:r>
             <a:endParaRPr lang="de-DE" sz="2000" dirty="0"/>
           </a:p>
           <a:p>

</xml_diff>